<commit_message>
Small fix on architecture slides
Signed-off-by: Matthias Stevens <matthias.stevens@gmail.com>
</commit_message>
<xml_diff>
--- a/Documentation/Architecture/Sapelli platform architecture.pptx
+++ b/Documentation/Architecture/Sapelli platform architecture.pptx
@@ -106,6 +106,11 @@
       </a:defRPr>
     </a:lvl9pPr>
   </p:defaultTextStyle>
+  <p:extLst>
+    <p:ext uri="{EFAFB233-063F-42B5-8137-9DF3F51BA10A}">
+      <p15:sldGuideLst xmlns:p15="http://schemas.microsoft.com/office/powerpoint/2012/main"/>
+    </p:ext>
+  </p:extLst>
 </p:presentation>
 </file>
 
@@ -240,7 +245,7 @@
           <a:p>
             <a:fld id="{F2864D7C-35FA-46B5-8554-43A1771F0FBB}" type="datetimeFigureOut">
               <a:rPr lang="en-GB" smtClean="0"/>
-              <a:t>15/04/2015</a:t>
+              <a:t>06/05/2015</a:t>
             </a:fld>
             <a:endParaRPr lang="en-GB"/>
           </a:p>
@@ -410,7 +415,7 @@
           <a:p>
             <a:fld id="{F2864D7C-35FA-46B5-8554-43A1771F0FBB}" type="datetimeFigureOut">
               <a:rPr lang="en-GB" smtClean="0"/>
-              <a:t>15/04/2015</a:t>
+              <a:t>06/05/2015</a:t>
             </a:fld>
             <a:endParaRPr lang="en-GB"/>
           </a:p>
@@ -590,7 +595,7 @@
           <a:p>
             <a:fld id="{F2864D7C-35FA-46B5-8554-43A1771F0FBB}" type="datetimeFigureOut">
               <a:rPr lang="en-GB" smtClean="0"/>
-              <a:t>15/04/2015</a:t>
+              <a:t>06/05/2015</a:t>
             </a:fld>
             <a:endParaRPr lang="en-GB"/>
           </a:p>
@@ -760,7 +765,7 @@
           <a:p>
             <a:fld id="{F2864D7C-35FA-46B5-8554-43A1771F0FBB}" type="datetimeFigureOut">
               <a:rPr lang="en-GB" smtClean="0"/>
-              <a:t>15/04/2015</a:t>
+              <a:t>06/05/2015</a:t>
             </a:fld>
             <a:endParaRPr lang="en-GB"/>
           </a:p>
@@ -1006,7 +1011,7 @@
           <a:p>
             <a:fld id="{F2864D7C-35FA-46B5-8554-43A1771F0FBB}" type="datetimeFigureOut">
               <a:rPr lang="en-GB" smtClean="0"/>
-              <a:t>15/04/2015</a:t>
+              <a:t>06/05/2015</a:t>
             </a:fld>
             <a:endParaRPr lang="en-GB"/>
           </a:p>
@@ -1238,7 +1243,7 @@
           <a:p>
             <a:fld id="{F2864D7C-35FA-46B5-8554-43A1771F0FBB}" type="datetimeFigureOut">
               <a:rPr lang="en-GB" smtClean="0"/>
-              <a:t>15/04/2015</a:t>
+              <a:t>06/05/2015</a:t>
             </a:fld>
             <a:endParaRPr lang="en-GB"/>
           </a:p>
@@ -1605,7 +1610,7 @@
           <a:p>
             <a:fld id="{F2864D7C-35FA-46B5-8554-43A1771F0FBB}" type="datetimeFigureOut">
               <a:rPr lang="en-GB" smtClean="0"/>
-              <a:t>15/04/2015</a:t>
+              <a:t>06/05/2015</a:t>
             </a:fld>
             <a:endParaRPr lang="en-GB"/>
           </a:p>
@@ -1723,7 +1728,7 @@
           <a:p>
             <a:fld id="{F2864D7C-35FA-46B5-8554-43A1771F0FBB}" type="datetimeFigureOut">
               <a:rPr lang="en-GB" smtClean="0"/>
-              <a:t>15/04/2015</a:t>
+              <a:t>06/05/2015</a:t>
             </a:fld>
             <a:endParaRPr lang="en-GB"/>
           </a:p>
@@ -1818,7 +1823,7 @@
           <a:p>
             <a:fld id="{F2864D7C-35FA-46B5-8554-43A1771F0FBB}" type="datetimeFigureOut">
               <a:rPr lang="en-GB" smtClean="0"/>
-              <a:t>15/04/2015</a:t>
+              <a:t>06/05/2015</a:t>
             </a:fld>
             <a:endParaRPr lang="en-GB"/>
           </a:p>
@@ -2095,7 +2100,7 @@
           <a:p>
             <a:fld id="{F2864D7C-35FA-46B5-8554-43A1771F0FBB}" type="datetimeFigureOut">
               <a:rPr lang="en-GB" smtClean="0"/>
-              <a:t>15/04/2015</a:t>
+              <a:t>06/05/2015</a:t>
             </a:fld>
             <a:endParaRPr lang="en-GB"/>
           </a:p>
@@ -2348,7 +2353,7 @@
           <a:p>
             <a:fld id="{F2864D7C-35FA-46B5-8554-43A1771F0FBB}" type="datetimeFigureOut">
               <a:rPr lang="en-GB" smtClean="0"/>
-              <a:t>15/04/2015</a:t>
+              <a:t>06/05/2015</a:t>
             </a:fld>
             <a:endParaRPr lang="en-GB"/>
           </a:p>
@@ -2561,7 +2566,7 @@
           <a:p>
             <a:fld id="{F2864D7C-35FA-46B5-8554-43A1771F0FBB}" type="datetimeFigureOut">
               <a:rPr lang="en-GB" smtClean="0"/>
-              <a:t>15/04/2015</a:t>
+              <a:t>06/05/2015</a:t>
             </a:fld>
             <a:endParaRPr lang="en-GB"/>
           </a:p>
@@ -3746,11 +3751,6 @@
                   </a:rPr>
                   <a:t> Collector</a:t>
                 </a:r>
-                <a:endParaRPr lang="en-GB" sz="1400" i="1" dirty="0">
-                  <a:solidFill>
-                    <a:prstClr val="black"/>
-                  </a:solidFill>
-                </a:endParaRPr>
               </a:p>
             </p:txBody>
           </p:sp>
@@ -4739,13 +4739,8 @@
                 <a:pPr algn="ctr"/>
                 <a:r>
                   <a:rPr lang="en-GB" sz="1600" dirty="0" smtClean="0"/>
-                  <a:t>HTTP </a:t>
+                  <a:t>HTTP over Wi-Fi/cellular</a:t>
                 </a:r>
-                <a:r>
-                  <a:rPr lang="en-GB" sz="1600" dirty="0" smtClean="0"/>
-                  <a:t>over Wi-Fi/cellular</a:t>
-                </a:r>
-                <a:endParaRPr lang="en-GB" sz="1600" dirty="0" smtClean="0"/>
               </a:p>
             </p:txBody>
           </p:sp>
@@ -5003,11 +4998,6 @@
                   </a:rPr>
                   <a:t> Collector</a:t>
                 </a:r>
-                <a:endParaRPr lang="en-GB" sz="1400" i="1" dirty="0">
-                  <a:solidFill>
-                    <a:prstClr val="black"/>
-                  </a:solidFill>
-                </a:endParaRPr>
               </a:p>
             </p:txBody>
           </p:sp>
@@ -5875,7 +5865,7 @@
                   <a:t>Using </a:t>
                 </a:r>
                 <a:r>
-                  <a:rPr lang="en-GB" sz="1400" dirty="0" err="1" smtClean="0">
+                  <a:rPr lang="en-GB" sz="1400" i="1" dirty="0" err="1" smtClean="0">
                     <a:solidFill>
                       <a:prstClr val="black"/>
                     </a:solidFill>

</xml_diff>